<commit_message>
Fix several of the comments made in class
</commit_message>
<xml_diff>
--- a/presentacion.pptx
+++ b/presentacion.pptx
@@ -587,8 +587,8 @@
         </p:nvSpPr>
         <p:spPr>
           <a:xfrm>
-            <a:off x="1143225" y="685800"/>
-            <a:ext cx="4572299" cy="3429000"/>
+            <a:off x="1143000" y="685800"/>
+            <a:ext cx="4572000" cy="3429000"/>
           </a:xfrm>
           <a:custGeom>
             <a:avLst/>
@@ -641,25 +641,7 @@
           </a:bodyPr>
           <a:lstStyle/>
           <a:p>
-            <a:endParaRPr/>
-          </a:p>
-          <a:p>
-            <a:r>
-              <a:t>----- Meeting Notes (13/06/13 20:56) -----</a:t>
-            </a:r>
-          </a:p>
-          <a:p>
-            <a:r>
-              <a:t>duracion*precio/hora</a:t>
-            </a:r>
-          </a:p>
-          <a:p>
-            <a:endParaRPr/>
-          </a:p>
-          <a:p>
-            <a:r>
-              <a:t>aclarar que de mayor a menor y decir que el 2do es desempate</a:t>
-            </a:r>
+            <a:endParaRPr dirty="0"/>
           </a:p>
         </p:txBody>
       </p:sp>
@@ -700,8 +682,8 @@
         </p:nvSpPr>
         <p:spPr>
           <a:xfrm>
-            <a:off x="1143225" y="685800"/>
-            <a:ext cx="4572299" cy="3429000"/>
+            <a:off x="1143000" y="685800"/>
+            <a:ext cx="4572000" cy="3429000"/>
           </a:xfrm>
           <a:custGeom>
             <a:avLst/>
@@ -754,17 +736,7 @@
           </a:bodyPr>
           <a:lstStyle/>
           <a:p>
-            <a:endParaRPr/>
-          </a:p>
-          <a:p>
-            <a:r>
-              <a:t>----- Meeting Notes (13/06/13 20:56) -----</a:t>
-            </a:r>
-          </a:p>
-          <a:p>
-            <a:r>
-              <a:t>make atractivo more abstracty</a:t>
-            </a:r>
+            <a:endParaRPr dirty="0"/>
           </a:p>
         </p:txBody>
       </p:sp>
@@ -900,8 +872,8 @@
         </p:nvSpPr>
         <p:spPr>
           <a:xfrm>
-            <a:off x="1143225" y="685800"/>
-            <a:ext cx="4572299" cy="3429000"/>
+            <a:off x="1143000" y="685800"/>
+            <a:ext cx="4572000" cy="3429000"/>
           </a:xfrm>
           <a:custGeom>
             <a:avLst/>
@@ -954,28 +926,31 @@
           </a:bodyPr>
           <a:lstStyle/>
           <a:p>
-            <a:endParaRPr/>
-          </a:p>
-          <a:p>
-            <a:r>
+            <a:endParaRPr dirty="0"/>
+          </a:p>
+          <a:p>
+            <a:r>
+              <a:rPr dirty="0"/>
               <a:t>----- Meeting Notes (13/06/13 20:56) -----</a:t>
             </a:r>
           </a:p>
           <a:p>
             <a:r>
-              <a:t>especificar la media n shit</a:t>
-            </a:r>
-          </a:p>
-          <a:p>
-            <a:r>
-              <a:t>tambien hacer tab, xq dependen del tamaño del proyecto</a:t>
-            </a:r>
-          </a:p>
-          <a:p>
-            <a:endParaRPr/>
-          </a:p>
-          <a:p>
-            <a:r>
+              <a:rPr dirty="0"/>
+              <a:t>especificar la media n </a:t>
+            </a:r>
+            <a:r>
+              <a:rPr dirty="0" smtClean="0"/>
+              <a:t>shit</a:t>
+            </a:r>
+            <a:endParaRPr dirty="0"/>
+          </a:p>
+          <a:p>
+            <a:endParaRPr dirty="0"/>
+          </a:p>
+          <a:p>
+            <a:r>
+              <a:rPr dirty="0"/>
               <a:t>insertar graficos en esta filmina que demuestren cuanto toma cada uno</a:t>
             </a:r>
           </a:p>
@@ -1883,8 +1858,8 @@
         </p:nvSpPr>
         <p:spPr>
           <a:xfrm>
-            <a:off x="1143225" y="685800"/>
-            <a:ext cx="4572299" cy="3429000"/>
+            <a:off x="1143000" y="685800"/>
+            <a:ext cx="4572000" cy="3429000"/>
           </a:xfrm>
           <a:custGeom>
             <a:avLst/>
@@ -1937,22 +1912,7 @@
           </a:bodyPr>
           <a:lstStyle/>
           <a:p>
-            <a:endParaRPr/>
-          </a:p>
-          <a:p>
-            <a:r>
-              <a:t>----- Meeting Notes (13/06/13 20:56) -----</a:t>
-            </a:r>
-          </a:p>
-          <a:p>
-            <a:r>
-              <a:t>indentar las ultimas 3 VAs </a:t>
-            </a:r>
-          </a:p>
-          <a:p>
-            <a:r>
-              <a:t>aclarar relacion entre duracion y desarrolladores</a:t>
-            </a:r>
+            <a:endParaRPr dirty="0"/>
           </a:p>
         </p:txBody>
       </p:sp>
@@ -2047,17 +2007,7 @@
           </a:bodyPr>
           <a:lstStyle/>
           <a:p>
-            <a:endParaRPr/>
-          </a:p>
-          <a:p>
-            <a:r>
-              <a:t>----- Meeting Notes (13/06/13 20:56) -----</a:t>
-            </a:r>
-          </a:p>
-          <a:p>
-            <a:r>
-              <a:t>primero guita ganada, despues costo</a:t>
-            </a:r>
+            <a:endParaRPr dirty="0"/>
           </a:p>
         </p:txBody>
       </p:sp>
@@ -2152,17 +2102,7 @@
           </a:bodyPr>
           <a:lstStyle/>
           <a:p>
-            <a:endParaRPr/>
-          </a:p>
-          <a:p>
-            <a:r>
-              <a:t>----- Meeting Notes (13/06/13 20:56) -----</a:t>
-            </a:r>
-          </a:p>
-          <a:p>
-            <a:r>
-              <a:t>historicamente bueno para is_awesome</a:t>
-            </a:r>
+            <a:endParaRPr dirty="0"/>
           </a:p>
         </p:txBody>
       </p:sp>
@@ -4961,21 +4901,53 @@
               <a:buNone/>
             </a:pPr>
             <a:r>
-              <a:rPr lang="en"/>
-              <a:t>Tienen 2 criterios: </a:t>
-            </a:r>
-          </a:p>
-          <a:p>
-            <a:pPr marL="914400" lvl="0" indent="457200" rtl="0">
+              <a:rPr lang="en" dirty="0"/>
+              <a:t>Tienen 2 </a:t>
+            </a:r>
+            <a:r>
+              <a:rPr lang="en" dirty="0" smtClean="0"/>
+              <a:t>criterios:</a:t>
+            </a:r>
+            <a:endParaRPr lang="es-ES_tradnl" dirty="0" smtClean="0"/>
+          </a:p>
+          <a:p>
+            <a:pPr marL="514350" lvl="0" indent="-514350" rtl="0">
+              <a:buSzPct val="100000"/>
+              <a:buFont typeface="+mj-lt"/>
+              <a:buAutoNum type="arabicPeriod"/>
+            </a:pPr>
+            <a:r>
+              <a:rPr lang="es-ES_tradnl" dirty="0"/>
+              <a:t> </a:t>
+            </a:r>
+            <a:r>
+              <a:rPr lang="es-ES_tradnl" dirty="0" smtClean="0"/>
+              <a:t>Para ordenar de mayor a menor</a:t>
+            </a:r>
+          </a:p>
+          <a:p>
+            <a:pPr marL="514350" lvl="0" indent="-514350" rtl="0">
+              <a:buSzPct val="100000"/>
+              <a:buFont typeface="+mj-lt"/>
+              <a:buAutoNum type="arabicPeriod"/>
+            </a:pPr>
+            <a:r>
+              <a:rPr lang="es-ES_tradnl" dirty="0" smtClean="0"/>
+              <a:t> Para desempatar</a:t>
+            </a:r>
+          </a:p>
+          <a:p>
+            <a:pPr marL="514350" lvl="0" indent="-514350" rtl="0">
+              <a:buFont typeface="+mj-lt"/>
+              <a:buAutoNum type="arabicPeriod"/>
+            </a:pPr>
+            <a:endParaRPr lang="es-ES_tradnl" dirty="0" smtClean="0"/>
+          </a:p>
+          <a:p>
+            <a:pPr marL="0" lvl="0" indent="0" rtl="0">
               <a:buNone/>
             </a:pPr>
-            <a:r>
-              <a:rPr lang="en"/>
-              <a:t>uno primario y uno secundario</a:t>
-            </a:r>
-          </a:p>
-          <a:p>
-            <a:endParaRPr lang="en"/>
+            <a:endParaRPr lang="en" dirty="0"/>
           </a:p>
           <a:p>
             <a:pPr marL="457200" lvl="0" indent="-419100" algn="ctr" rtl="0">
@@ -4987,15 +4959,18 @@
               <a:buChar char="•"/>
             </a:pPr>
             <a:r>
-              <a:rPr lang="en"/>
-              <a:t>Precio/hora - Horas</a:t>
-            </a:r>
-          </a:p>
-          <a:p>
-            <a:endParaRPr lang="en"/>
-          </a:p>
-          <a:p>
-            <a:endParaRPr lang="en"/>
+              <a:rPr lang="en" dirty="0"/>
+              <a:t>Precio/hora </a:t>
+            </a:r>
+            <a:r>
+              <a:rPr lang="en-US" dirty="0" smtClean="0"/>
+              <a:t>-</a:t>
+            </a:r>
+            <a:r>
+              <a:rPr lang="en" dirty="0" smtClean="0"/>
+              <a:t> Horas</a:t>
+            </a:r>
+            <a:endParaRPr lang="en" dirty="0"/>
           </a:p>
           <a:p>
             <a:pPr marL="457200" lvl="0" indent="-419100" algn="ctr" rtl="0">
@@ -5007,12 +4982,12 @@
               <a:buChar char="•"/>
             </a:pPr>
             <a:r>
-              <a:rPr lang="en"/>
+              <a:rPr lang="en" dirty="0"/>
               <a:t>Facturación - Precio/hora</a:t>
             </a:r>
           </a:p>
           <a:p>
-            <a:endParaRPr lang="en"/>
+            <a:endParaRPr lang="en" dirty="0"/>
           </a:p>
         </p:txBody>
       </p:sp>
@@ -5120,12 +5095,12 @@
               <a:buChar char="•"/>
             </a:pPr>
             <a:r>
-              <a:rPr lang="en"/>
+              <a:rPr lang="en" dirty="0"/>
               <a:t>Por si llega un proyecto atractivo y no se lo puede aceptar</a:t>
             </a:r>
           </a:p>
           <a:p>
-            <a:endParaRPr lang="en"/>
+            <a:endParaRPr lang="en" dirty="0"/>
           </a:p>
           <a:p>
             <a:pPr marL="457200" lvl="0" indent="-419100" rtl="0">
@@ -5137,12 +5112,12 @@
               <a:buChar char="•"/>
             </a:pPr>
             <a:r>
-              <a:rPr lang="en"/>
+              <a:rPr lang="en" dirty="0"/>
               <a:t>Se activan desarrolladores reservados</a:t>
             </a:r>
           </a:p>
           <a:p>
-            <a:endParaRPr lang="en"/>
+            <a:endParaRPr lang="en" dirty="0"/>
           </a:p>
           <a:p>
             <a:pPr marL="457200" lvl="0" indent="-419100" rtl="0">
@@ -5154,19 +5129,36 @@
               <a:buChar char="•"/>
             </a:pPr>
             <a:r>
-              <a:rPr lang="en"/>
+              <a:rPr lang="en" dirty="0"/>
               <a:t>La estrategia determina que es </a:t>
             </a:r>
             <a:r>
-              <a:rPr lang="en" b="1" i="1"/>
+              <a:rPr lang="en" b="1" i="1" dirty="0" smtClean="0"/>
               <a:t>atractivo</a:t>
             </a:r>
-          </a:p>
-          <a:p>
-            <a:endParaRPr lang="en" b="1" i="1"/>
-          </a:p>
-          <a:p>
-            <a:endParaRPr lang="en" b="1" i="1"/>
+            <a:endParaRPr lang="es-ES_tradnl" b="1" i="1" dirty="0" smtClean="0"/>
+          </a:p>
+          <a:p>
+            <a:pPr marL="857250" lvl="1" indent="-419100">
+              <a:buSzPct val="166666"/>
+              <a:buFont typeface="Arial"/>
+              <a:buChar char="•"/>
+            </a:pPr>
+            <a:r>
+              <a:rPr lang="es-ES_tradnl" dirty="0" smtClean="0"/>
+              <a:t>Los proyectos mejores que el 80% percentil </a:t>
+            </a:r>
+            <a:r>
+              <a:rPr lang="es-ES_tradnl" dirty="0" err="1" smtClean="0"/>
+              <a:t>historico</a:t>
+            </a:r>
+            <a:endParaRPr lang="en" dirty="0"/>
+          </a:p>
+          <a:p>
+            <a:endParaRPr lang="en" b="1" i="1" dirty="0"/>
+          </a:p>
+          <a:p>
+            <a:endParaRPr lang="en" b="1" i="1" dirty="0"/>
           </a:p>
         </p:txBody>
       </p:sp>
@@ -5419,12 +5411,12 @@
               <a:buChar char="•"/>
             </a:pPr>
             <a:r>
-              <a:rPr lang="en"/>
+              <a:rPr lang="en" dirty="0"/>
               <a:t>Cantidad de proyectos por mes. P(3)</a:t>
             </a:r>
           </a:p>
           <a:p>
-            <a:endParaRPr lang="en"/>
+            <a:endParaRPr lang="en" dirty="0"/>
           </a:p>
           <a:p>
             <a:pPr marL="457200" lvl="0" indent="-419100" rtl="0">
@@ -5436,58 +5428,51 @@
               <a:buChar char="•"/>
             </a:pPr>
             <a:r>
-              <a:rPr lang="en"/>
+              <a:rPr lang="en" dirty="0"/>
               <a:t>Tipo de proyecto. U(10%/75%/15%)</a:t>
             </a:r>
           </a:p>
           <a:p>
-            <a:endParaRPr lang="en"/>
-          </a:p>
-          <a:p>
-            <a:pPr marL="457200" lvl="0" indent="-419100" rtl="0">
-              <a:buClr>
-                <a:srgbClr val="000000"/>
-              </a:buClr>
+            <a:endParaRPr lang="en" dirty="0"/>
+          </a:p>
+          <a:p>
+            <a:pPr marL="857250" lvl="1" indent="-419100">
               <a:buSzPct val="166666"/>
               <a:buFont typeface="Arial"/>
               <a:buChar char="•"/>
             </a:pPr>
             <a:r>
-              <a:rPr lang="en"/>
+              <a:rPr lang="en" dirty="0"/>
               <a:t>Tamaño de proyecto. Triangular</a:t>
             </a:r>
           </a:p>
           <a:p>
-            <a:endParaRPr lang="en"/>
-          </a:p>
-          <a:p>
-            <a:pPr marL="457200" lvl="0" indent="-419100" rtl="0">
-              <a:buClr>
-                <a:srgbClr val="000000"/>
-              </a:buClr>
+            <a:pPr lvl="1"/>
+            <a:endParaRPr lang="en" dirty="0"/>
+          </a:p>
+          <a:p>
+            <a:pPr marL="857250" lvl="1" indent="-419100">
               <a:buSzPct val="166666"/>
               <a:buFont typeface="Arial"/>
               <a:buChar char="•"/>
             </a:pPr>
             <a:r>
-              <a:rPr lang="en"/>
+              <a:rPr lang="en" dirty="0"/>
               <a:t>Precio hora-hombre del proyecto. Triangular</a:t>
             </a:r>
           </a:p>
           <a:p>
-            <a:endParaRPr lang="en"/>
-          </a:p>
-          <a:p>
-            <a:pPr marL="457200" lvl="0" indent="-419100">
-              <a:buClr>
-                <a:srgbClr val="000000"/>
-              </a:buClr>
+            <a:pPr lvl="1"/>
+            <a:endParaRPr lang="en" dirty="0"/>
+          </a:p>
+          <a:p>
+            <a:pPr marL="857250" lvl="1" indent="-419100">
               <a:buSzPct val="166666"/>
               <a:buFont typeface="Arial"/>
               <a:buChar char="•"/>
             </a:pPr>
             <a:r>
-              <a:rPr lang="en"/>
+              <a:rPr lang="en" dirty="0"/>
               <a:t>Desarrolladores pretendidos. Uniforme.</a:t>
             </a:r>
           </a:p>
@@ -7261,9 +7246,14 @@
               <a:buChar char="•"/>
             </a:pPr>
             <a:r>
-              <a:rPr lang="en" sz="2800"/>
-              <a:t>Cantidad de proyectos que llegan en un determinado período.</a:t>
-            </a:r>
+              <a:rPr lang="en" sz="2800" dirty="0"/>
+              <a:t>Cantidad de proyectos que llegan en un determinado período</a:t>
+            </a:r>
+            <a:r>
+              <a:rPr lang="en" sz="2800" dirty="0" smtClean="0"/>
+              <a:t>.</a:t>
+            </a:r>
+            <a:endParaRPr lang="es-ES_tradnl" sz="2800" dirty="0" smtClean="0"/>
           </a:p>
           <a:p>
             <a:pPr marL="457200" lvl="0" indent="-419100" rtl="0">
@@ -7274,10 +7264,7 @@
               <a:buFont typeface="Arial"/>
               <a:buChar char="•"/>
             </a:pPr>
-            <a:r>
-              <a:rPr lang="en" sz="2800"/>
-              <a:t>Tipo del proyecto (pequeño, mediano o grande).</a:t>
-            </a:r>
+            <a:endParaRPr lang="en" sz="2800" dirty="0"/>
           </a:p>
           <a:p>
             <a:pPr marL="457200" lvl="0" indent="-419100" rtl="0">
@@ -7289,55 +7276,112 @@
               <a:buChar char="•"/>
             </a:pPr>
             <a:r>
-              <a:rPr lang="en" sz="2800"/>
-              <a:t>Tamaño del proyecto (medido en horas-hombre).</a:t>
-            </a:r>
-          </a:p>
-          <a:p>
-            <a:pPr marL="457200" lvl="0" indent="-419100" rtl="0">
-              <a:buClr>
-                <a:srgbClr val="000000"/>
-              </a:buClr>
+              <a:rPr lang="en" sz="2800" dirty="0"/>
+              <a:t>Tipo del proyecto (pequeño, mediano o grande).</a:t>
+            </a:r>
+          </a:p>
+          <a:p>
+            <a:pPr marL="857250" lvl="1" indent="-419100">
               <a:buSzPct val="178571"/>
               <a:buFont typeface="Arial"/>
               <a:buChar char="•"/>
             </a:pPr>
             <a:r>
-              <a:rPr lang="en" sz="2800"/>
-              <a:t>Precio por hora del proyecto.</a:t>
-            </a:r>
-          </a:p>
-          <a:p>
-            <a:endParaRPr lang="en" sz="2800"/>
-          </a:p>
-          <a:p>
-            <a:pPr marL="457200" lvl="0" indent="-419100" rtl="0">
-              <a:buClr>
-                <a:srgbClr val="000000"/>
-              </a:buClr>
+              <a:rPr lang="en" sz="2200" dirty="0"/>
+              <a:t>Tamaño del proyecto (medido en horas-hombre).</a:t>
+            </a:r>
+          </a:p>
+          <a:p>
+            <a:pPr marL="857250" lvl="1" indent="-419100">
               <a:buSzPct val="178571"/>
               <a:buFont typeface="Arial"/>
               <a:buChar char="•"/>
             </a:pPr>
             <a:r>
-              <a:rPr lang="en" sz="2800"/>
-              <a:t>Cantidad de desarrolladores pretendidos.</a:t>
-            </a:r>
-          </a:p>
-          <a:p>
-            <a:endParaRPr lang="en" sz="2800"/>
-          </a:p>
-          <a:p>
-            <a:endParaRPr lang="en" sz="2800"/>
-          </a:p>
-          <a:p>
-            <a:endParaRPr lang="en" sz="2800"/>
-          </a:p>
-          <a:p>
-            <a:endParaRPr lang="en" sz="2800"/>
+              <a:rPr lang="en" sz="2200" dirty="0"/>
+              <a:t>Precio por hora del proyecto</a:t>
+            </a:r>
+            <a:r>
+              <a:rPr lang="en" sz="2200" dirty="0" smtClean="0"/>
+              <a:t>.</a:t>
+            </a:r>
+            <a:endParaRPr lang="en" sz="2200" dirty="0"/>
+          </a:p>
+          <a:p>
+            <a:pPr marL="857250" lvl="1" indent="-419100">
+              <a:buSzPct val="178571"/>
+              <a:buFont typeface="Arial"/>
+              <a:buChar char="•"/>
+            </a:pPr>
+            <a:r>
+              <a:rPr lang="en" sz="2200" dirty="0"/>
+              <a:t>Cantidad de desarrolladores pretendidos</a:t>
+            </a:r>
+            <a:r>
+              <a:rPr lang="en" sz="2200" dirty="0" smtClean="0"/>
+              <a:t>.</a:t>
+            </a:r>
+            <a:endParaRPr lang="es-ES_tradnl" sz="2200" dirty="0" smtClean="0"/>
+          </a:p>
+          <a:p>
+            <a:pPr marL="838200" lvl="2" indent="0">
+              <a:buSzPct val="178571"/>
+              <a:buNone/>
+            </a:pPr>
+            <a:endParaRPr lang="es-ES_tradnl" sz="2200" dirty="0"/>
+          </a:p>
+          <a:p>
+            <a:pPr marL="1257300" lvl="2" indent="-419100">
+              <a:buSzPct val="178571"/>
+              <a:buFont typeface="Arial"/>
+              <a:buChar char="•"/>
+            </a:pPr>
+            <a:endParaRPr lang="en" sz="2200" dirty="0"/>
+          </a:p>
+          <a:p>
+            <a:endParaRPr lang="en" sz="2800" dirty="0"/>
+          </a:p>
+          <a:p>
+            <a:endParaRPr lang="en" sz="2800" dirty="0"/>
+          </a:p>
+          <a:p>
+            <a:endParaRPr lang="en" sz="2800" dirty="0"/>
+          </a:p>
+          <a:p>
+            <a:endParaRPr lang="en" sz="2800" dirty="0"/>
           </a:p>
         </p:txBody>
       </p:sp>
+      <p:pic>
+        <p:nvPicPr>
+          <p:cNvPr id="3" name="Picture 2" descr="CodeCogsEqn.png"/>
+          <p:cNvPicPr>
+            <a:picLocks noChangeAspect="1"/>
+          </p:cNvPicPr>
+          <p:nvPr/>
+        </p:nvPicPr>
+        <p:blipFill>
+          <a:blip r:embed="rId3">
+            <a:extLst>
+              <a:ext uri="{28A0092B-C50C-407E-A947-70E740481C1C}">
+                <a14:useLocalDpi xmlns:a14="http://schemas.microsoft.com/office/drawing/2010/main" val="0"/>
+              </a:ext>
+            </a:extLst>
+          </a:blip>
+          <a:stretch>
+            <a:fillRect/>
+          </a:stretch>
+        </p:blipFill>
+        <p:spPr>
+          <a:xfrm>
+            <a:off x="1725580" y="5008357"/>
+            <a:ext cx="5266690" cy="586740"/>
+          </a:xfrm>
+          <a:prstGeom prst="rect">
+            <a:avLst/>
+          </a:prstGeom>
+        </p:spPr>
+      </p:pic>
     </p:spTree>
   </p:cSld>
   <p:clrMapOvr>
@@ -7433,6 +7477,23 @@
           </a:bodyPr>
           <a:lstStyle/>
           <a:p>
+            <a:pPr marL="457200" indent="-419100"/>
+            <a:r>
+              <a:rPr lang="en" dirty="0"/>
+              <a:t>Ingreso generado por los proyectos aceptados.</a:t>
+            </a:r>
+          </a:p>
+          <a:p>
+            <a:pPr marL="38100" lvl="0" indent="0" rtl="0">
+              <a:buClr>
+                <a:srgbClr val="000000"/>
+              </a:buClr>
+              <a:buSzPct val="166666"/>
+              <a:buNone/>
+            </a:pPr>
+            <a:endParaRPr lang="es-ES_tradnl" dirty="0" smtClean="0"/>
+          </a:p>
+          <a:p>
             <a:pPr marL="457200" lvl="0" indent="-419100" rtl="0">
               <a:buClr>
                 <a:srgbClr val="000000"/>
@@ -7462,20 +7523,6 @@
               <a:buChar char="•"/>
             </a:pPr>
             <a:endParaRPr lang="en" dirty="0"/>
-          </a:p>
-          <a:p>
-            <a:pPr marL="457200" lvl="0" indent="-419100" rtl="0">
-              <a:buClr>
-                <a:srgbClr val="000000"/>
-              </a:buClr>
-              <a:buSzPct val="166666"/>
-              <a:buFont typeface="Arial"/>
-              <a:buChar char="•"/>
-            </a:pPr>
-            <a:r>
-              <a:rPr lang="en" dirty="0"/>
-              <a:t>Ingreso generado por los proyectos aceptados.</a:t>
-            </a:r>
           </a:p>
           <a:p>
             <a:endParaRPr lang="en" dirty="0"/>

</xml_diff>

<commit_message>
Update presentation with latest comments
</commit_message>
<xml_diff>
--- a/presentacion.pptx
+++ b/presentacion.pptx
@@ -572,7 +572,7 @@
   <p:cSld>
     <p:spTree>
       <p:nvGrpSpPr>
-        <p:cNvPr id="1" name="Shape 90"/>
+        <p:cNvPr id="1" name="Shape 84"/>
         <p:cNvGrpSpPr/>
         <p:nvPr/>
       </p:nvGrpSpPr>
@@ -586,7 +586,7 @@
       </p:grpSpPr>
       <p:sp>
         <p:nvSpPr>
-          <p:cNvPr id="91" name="Shape 91"/>
+          <p:cNvPr id="85" name="Shape 85"/>
           <p:cNvSpPr>
             <a:spLocks noGrp="1" noRot="1" noChangeAspect="1"/>
           </p:cNvSpPr>
@@ -596,8 +596,8 @@
         </p:nvSpPr>
         <p:spPr>
           <a:xfrm>
-            <a:off x="1143000" y="685800"/>
-            <a:ext cx="4572000" cy="3429000"/>
+            <a:off x="1143225" y="685800"/>
+            <a:ext cx="4572299" cy="3429000"/>
           </a:xfrm>
           <a:custGeom>
             <a:avLst/>
@@ -627,7 +627,7 @@
       </p:sp>
       <p:sp>
         <p:nvSpPr>
-          <p:cNvPr id="92" name="Shape 92"/>
+          <p:cNvPr id="86" name="Shape 86"/>
           <p:cNvSpPr txBox="1">
             <a:spLocks noGrp="1"/>
           </p:cNvSpPr>
@@ -651,6 +651,18 @@
           <a:lstStyle/>
           <a:p>
             <a:endParaRPr dirty="0"/>
+          </a:p>
+          <a:p>
+            <a:r>
+              <a:rPr dirty="0"/>
+              <a:t>----- Meeting Notes (27/06/13 21:27) -----</a:t>
+            </a:r>
+          </a:p>
+          <a:p>
+            <a:r>
+              <a:rPr dirty="0"/>
+              <a:t>aclarar tiempos, vease T y duracion de periodo</a:t>
+            </a:r>
           </a:p>
         </p:txBody>
       </p:sp>
@@ -667,7 +679,7 @@
   <p:cSld>
     <p:spTree>
       <p:nvGrpSpPr>
-        <p:cNvPr id="1" name="Shape 96"/>
+        <p:cNvPr id="1" name="Shape 90"/>
         <p:cNvGrpSpPr/>
         <p:nvPr/>
       </p:nvGrpSpPr>
@@ -681,7 +693,7 @@
       </p:grpSpPr>
       <p:sp>
         <p:nvSpPr>
-          <p:cNvPr id="97" name="Shape 97"/>
+          <p:cNvPr id="91" name="Shape 91"/>
           <p:cNvSpPr>
             <a:spLocks noGrp="1" noRot="1" noChangeAspect="1"/>
           </p:cNvSpPr>
@@ -722,7 +734,7 @@
       </p:sp>
       <p:sp>
         <p:nvSpPr>
-          <p:cNvPr id="98" name="Shape 98"/>
+          <p:cNvPr id="92" name="Shape 92"/>
           <p:cNvSpPr txBox="1">
             <a:spLocks noGrp="1"/>
           </p:cNvSpPr>
@@ -762,7 +774,7 @@
   <p:cSld>
     <p:spTree>
       <p:nvGrpSpPr>
-        <p:cNvPr id="1" name="Shape 102"/>
+        <p:cNvPr id="1" name="Shape 96"/>
         <p:cNvGrpSpPr/>
         <p:nvPr/>
       </p:nvGrpSpPr>
@@ -776,7 +788,7 @@
       </p:grpSpPr>
       <p:sp>
         <p:nvSpPr>
-          <p:cNvPr id="103" name="Shape 103"/>
+          <p:cNvPr id="97" name="Shape 97"/>
           <p:cNvSpPr>
             <a:spLocks noGrp="1" noRot="1" noChangeAspect="1"/>
           </p:cNvSpPr>
@@ -817,7 +829,7 @@
       </p:sp>
       <p:sp>
         <p:nvSpPr>
-          <p:cNvPr id="104" name="Shape 104"/>
+          <p:cNvPr id="98" name="Shape 98"/>
           <p:cNvSpPr txBox="1">
             <a:spLocks noGrp="1"/>
           </p:cNvSpPr>
@@ -840,7 +852,7 @@
           </a:bodyPr>
           <a:lstStyle/>
           <a:p>
-            <a:endParaRPr/>
+            <a:endParaRPr dirty="0"/>
           </a:p>
         </p:txBody>
       </p:sp>
@@ -857,7 +869,7 @@
   <p:cSld>
     <p:spTree>
       <p:nvGrpSpPr>
-        <p:cNvPr id="1" name="Shape 108"/>
+        <p:cNvPr id="1" name="Shape 102"/>
         <p:cNvGrpSpPr/>
         <p:nvPr/>
       </p:nvGrpSpPr>
@@ -871,7 +883,7 @@
       </p:grpSpPr>
       <p:sp>
         <p:nvSpPr>
-          <p:cNvPr id="109" name="Shape 109"/>
+          <p:cNvPr id="103" name="Shape 103"/>
           <p:cNvSpPr>
             <a:spLocks noGrp="1" noRot="1" noChangeAspect="1"/>
           </p:cNvSpPr>
@@ -912,7 +924,7 @@
       </p:sp>
       <p:sp>
         <p:nvSpPr>
-          <p:cNvPr id="110" name="Shape 110"/>
+          <p:cNvPr id="104" name="Shape 104"/>
           <p:cNvSpPr txBox="1">
             <a:spLocks noGrp="1"/>
           </p:cNvSpPr>
@@ -935,32 +947,18 @@
           </a:bodyPr>
           <a:lstStyle/>
           <a:p>
-            <a:endParaRPr dirty="0"/>
-          </a:p>
-          <a:p>
-            <a:r>
-              <a:rPr dirty="0"/>
-              <a:t>----- Meeting Notes (13/06/13 20:56) -----</a:t>
-            </a:r>
-          </a:p>
-          <a:p>
-            <a:r>
-              <a:rPr dirty="0"/>
-              <a:t>especificar la media n </a:t>
-            </a:r>
-            <a:r>
-              <a:rPr dirty="0" smtClean="0"/>
-              <a:t>shit</a:t>
-            </a:r>
-            <a:endParaRPr dirty="0"/>
-          </a:p>
-          <a:p>
-            <a:endParaRPr dirty="0"/>
-          </a:p>
-          <a:p>
-            <a:r>
-              <a:rPr dirty="0"/>
-              <a:t>insertar graficos en esta filmina que demuestren cuanto toma cada uno</a:t>
+            <a:endParaRPr/>
+          </a:p>
+          <a:p>
+            <a:r>
+              <a:rPr/>
+              <a:t>----- Meeting Notes (27/06/13 21:27) -----</a:t>
+            </a:r>
+          </a:p>
+          <a:p>
+            <a:r>
+              <a:rPr/>
+              <a:t>mergear esta diapo y la anterior (y dar vuelta el orden)</a:t>
             </a:r>
           </a:p>
         </p:txBody>
@@ -978,7 +976,7 @@
   <p:cSld>
     <p:spTree>
       <p:nvGrpSpPr>
-        <p:cNvPr id="1" name="Shape 115"/>
+        <p:cNvPr id="1" name="Shape 108"/>
         <p:cNvGrpSpPr/>
         <p:nvPr/>
       </p:nvGrpSpPr>
@@ -992,7 +990,7 @@
       </p:grpSpPr>
       <p:sp>
         <p:nvSpPr>
-          <p:cNvPr id="116" name="Shape 116"/>
+          <p:cNvPr id="109" name="Shape 109"/>
           <p:cNvSpPr>
             <a:spLocks noGrp="1" noRot="1" noChangeAspect="1"/>
           </p:cNvSpPr>
@@ -1033,7 +1031,7 @@
       </p:sp>
       <p:sp>
         <p:nvSpPr>
-          <p:cNvPr id="117" name="Shape 117"/>
+          <p:cNvPr id="110" name="Shape 110"/>
           <p:cNvSpPr txBox="1">
             <a:spLocks noGrp="1"/>
           </p:cNvSpPr>
@@ -1056,7 +1054,54 @@
           </a:bodyPr>
           <a:lstStyle/>
           <a:p>
-            <a:endParaRPr/>
+            <a:endParaRPr dirty="0"/>
+          </a:p>
+          <a:p>
+            <a:r>
+              <a:rPr dirty="0"/>
+              <a:t>----- Meeting Notes (13/06/13 20:56) -----</a:t>
+            </a:r>
+          </a:p>
+          <a:p>
+            <a:r>
+              <a:rPr dirty="0"/>
+              <a:t>especificar la media n </a:t>
+            </a:r>
+            <a:r>
+              <a:rPr dirty="0" smtClean="0"/>
+              <a:t>shit</a:t>
+            </a:r>
+            <a:endParaRPr dirty="0"/>
+          </a:p>
+          <a:p>
+            <a:endParaRPr dirty="0"/>
+          </a:p>
+          <a:p>
+            <a:r>
+              <a:rPr dirty="0"/>
+              <a:t>insertar graficos en esta filmina que demuestren cuanto toma cada uno</a:t>
+            </a:r>
+          </a:p>
+          <a:p>
+            <a:r>
+              <a:rPr dirty="0"/>
+              <a:t>----- Meeting Notes (27/06/13 21:27) -----</a:t>
+            </a:r>
+          </a:p>
+          <a:p>
+            <a:r>
+              <a:rPr dirty="0"/>
+              <a:t>remover grafico de esta?</a:t>
+            </a:r>
+          </a:p>
+          <a:p>
+            <a:endParaRPr dirty="0"/>
+          </a:p>
+          <a:p>
+            <a:r>
+              <a:rPr dirty="0"/>
+              <a:t>confunde a serie de tiempo</a:t>
+            </a:r>
           </a:p>
         </p:txBody>
       </p:sp>
@@ -1069,11 +1114,11 @@
 </file>
 
 <file path=ppt/notesSlides/notesSlide15.xml><?xml version="1.0" encoding="utf-8"?>
-<p:notes xmlns:a="http://schemas.openxmlformats.org/drawingml/2006/main" xmlns:r="http://schemas.openxmlformats.org/officeDocument/2006/relationships" xmlns:p="http://schemas.openxmlformats.org/presentationml/2006/main" showMasterSp="0" showMasterPhAnim="0">
+<p:notes xmlns:a="http://schemas.openxmlformats.org/drawingml/2006/main" xmlns:r="http://schemas.openxmlformats.org/officeDocument/2006/relationships" xmlns:p="http://schemas.openxmlformats.org/presentationml/2006/main">
   <p:cSld>
     <p:spTree>
       <p:nvGrpSpPr>
-        <p:cNvPr id="1" name="Shape 121"/>
+        <p:cNvPr id="1" name=""/>
         <p:cNvGrpSpPr/>
         <p:nvPr/>
       </p:nvGrpSpPr>
@@ -1087,7 +1132,168 @@
       </p:grpSpPr>
       <p:sp>
         <p:nvSpPr>
-          <p:cNvPr id="122" name="Shape 122"/>
+          <p:cNvPr id="2" name="Slide Image Placeholder 1"/>
+          <p:cNvSpPr>
+            <a:spLocks noGrp="1" noRot="1" noChangeAspect="1"/>
+          </p:cNvSpPr>
+          <p:nvPr>
+            <p:ph type="sldImg"/>
+          </p:nvPr>
+        </p:nvSpPr>
+        <p:spPr/>
+      </p:sp>
+      <p:sp>
+        <p:nvSpPr>
+          <p:cNvPr id="3" name="Notes Placeholder 2"/>
+          <p:cNvSpPr>
+            <a:spLocks noGrp="1"/>
+          </p:cNvSpPr>
+          <p:nvPr>
+            <p:ph type="body" idx="1"/>
+          </p:nvPr>
+        </p:nvSpPr>
+        <p:spPr/>
+        <p:txBody>
+          <a:bodyPr/>
+          <a:lstStyle/>
+          <a:p>
+            <a:endParaRPr lang="en-US"/>
+          </a:p>
+          <a:p>
+            <a:r>
+              <a:rPr lang="en-US"/>
+              <a:t>----- Meeting Notes (27/06/13 21:27) -----</a:t>
+            </a:r>
+          </a:p>
+          <a:p>
+            <a:r>
+              <a:rPr lang="en-US"/>
+              <a:t>confunde, again</a:t>
+            </a:r>
+          </a:p>
+          <a:p>
+            <a:endParaRPr lang="en-US"/>
+          </a:p>
+          <a:p>
+            <a:r>
+              <a:rPr lang="en-US"/>
+              <a:t>layout horizontal en vez de vertical, merge con la anterior</a:t>
+            </a:r>
+          </a:p>
+        </p:txBody>
+      </p:sp>
+    </p:spTree>
+    <p:extLst>
+      <p:ext uri="{BB962C8B-B14F-4D97-AF65-F5344CB8AC3E}">
+        <p14:creationId xmlns:p14="http://schemas.microsoft.com/office/powerpoint/2010/main" val="2739947107"/>
+      </p:ext>
+    </p:extLst>
+  </p:cSld>
+  <p:clrMapOvr>
+    <a:masterClrMapping/>
+  </p:clrMapOvr>
+</p:notes>
+</file>
+
+<file path=ppt/notesSlides/notesSlide16.xml><?xml version="1.0" encoding="utf-8"?>
+<p:notes xmlns:a="http://schemas.openxmlformats.org/drawingml/2006/main" xmlns:r="http://schemas.openxmlformats.org/officeDocument/2006/relationships" xmlns:p="http://schemas.openxmlformats.org/presentationml/2006/main">
+  <p:cSld>
+    <p:spTree>
+      <p:nvGrpSpPr>
+        <p:cNvPr id="1" name=""/>
+        <p:cNvGrpSpPr/>
+        <p:nvPr/>
+      </p:nvGrpSpPr>
+      <p:grpSpPr>
+        <a:xfrm>
+          <a:off x="0" y="0"/>
+          <a:ext cx="0" cy="0"/>
+          <a:chOff x="0" y="0"/>
+          <a:chExt cx="0" cy="0"/>
+        </a:xfrm>
+      </p:grpSpPr>
+      <p:sp>
+        <p:nvSpPr>
+          <p:cNvPr id="2" name="Slide Image Placeholder 1"/>
+          <p:cNvSpPr>
+            <a:spLocks noGrp="1" noRot="1" noChangeAspect="1"/>
+          </p:cNvSpPr>
+          <p:nvPr>
+            <p:ph type="sldImg"/>
+          </p:nvPr>
+        </p:nvSpPr>
+        <p:spPr/>
+      </p:sp>
+      <p:sp>
+        <p:nvSpPr>
+          <p:cNvPr id="3" name="Notes Placeholder 2"/>
+          <p:cNvSpPr>
+            <a:spLocks noGrp="1"/>
+          </p:cNvSpPr>
+          <p:nvPr>
+            <p:ph type="body" idx="1"/>
+          </p:nvPr>
+        </p:nvSpPr>
+        <p:spPr/>
+        <p:txBody>
+          <a:bodyPr/>
+          <a:lstStyle/>
+          <a:p>
+            <a:endParaRPr lang="en-US"/>
+          </a:p>
+          <a:p>
+            <a:r>
+              <a:rPr lang="en-US"/>
+              <a:t>----- Meeting Notes (27/06/13 21:27) -----</a:t>
+            </a:r>
+          </a:p>
+          <a:p>
+            <a:r>
+              <a:rPr lang="en-US"/>
+              <a:t>graficos, no histogramas</a:t>
+            </a:r>
+          </a:p>
+          <a:p>
+            <a:r>
+              <a:rPr lang="en-US"/>
+              <a:t>que se pueda comparar entre tamaños</a:t>
+            </a:r>
+          </a:p>
+        </p:txBody>
+      </p:sp>
+    </p:spTree>
+    <p:extLst>
+      <p:ext uri="{BB962C8B-B14F-4D97-AF65-F5344CB8AC3E}">
+        <p14:creationId xmlns:p14="http://schemas.microsoft.com/office/powerpoint/2010/main" val="552037487"/>
+      </p:ext>
+    </p:extLst>
+  </p:cSld>
+  <p:clrMapOvr>
+    <a:masterClrMapping/>
+  </p:clrMapOvr>
+</p:notes>
+</file>
+
+<file path=ppt/notesSlides/notesSlide17.xml><?xml version="1.0" encoding="utf-8"?>
+<p:notes xmlns:a="http://schemas.openxmlformats.org/drawingml/2006/main" xmlns:r="http://schemas.openxmlformats.org/officeDocument/2006/relationships" xmlns:p="http://schemas.openxmlformats.org/presentationml/2006/main" showMasterSp="0" showMasterPhAnim="0">
+  <p:cSld>
+    <p:spTree>
+      <p:nvGrpSpPr>
+        <p:cNvPr id="1" name="Shape 115"/>
+        <p:cNvGrpSpPr/>
+        <p:nvPr/>
+      </p:nvGrpSpPr>
+      <p:grpSpPr>
+        <a:xfrm>
+          <a:off x="0" y="0"/>
+          <a:ext cx="0" cy="0"/>
+          <a:chOff x="0" y="0"/>
+          <a:chExt cx="0" cy="0"/>
+        </a:xfrm>
+      </p:grpSpPr>
+      <p:sp>
+        <p:nvSpPr>
+          <p:cNvPr id="116" name="Shape 116"/>
           <p:cNvSpPr>
             <a:spLocks noGrp="1" noRot="1" noChangeAspect="1"/>
           </p:cNvSpPr>
@@ -1128,7 +1334,7 @@
       </p:sp>
       <p:sp>
         <p:nvSpPr>
-          <p:cNvPr id="123" name="Shape 123"/>
+          <p:cNvPr id="117" name="Shape 117"/>
           <p:cNvSpPr txBox="1">
             <a:spLocks noGrp="1"/>
           </p:cNvSpPr>
@@ -1152,16 +1358,6 @@
           <a:lstStyle/>
           <a:p>
             <a:endParaRPr/>
-          </a:p>
-          <a:p>
-            <a:r>
-              <a:t>----- Meeting Notes (13/06/13 20:56) -----</a:t>
-            </a:r>
-          </a:p>
-          <a:p>
-            <a:r>
-              <a:t>añadir el plan de cuadros en una filmina</a:t>
-            </a:r>
           </a:p>
         </p:txBody>
       </p:sp>
@@ -1173,12 +1369,12 @@
 </p:notes>
 </file>
 
-<file path=ppt/notesSlides/notesSlide16.xml><?xml version="1.0" encoding="utf-8"?>
+<file path=ppt/notesSlides/notesSlide18.xml><?xml version="1.0" encoding="utf-8"?>
 <p:notes xmlns:a="http://schemas.openxmlformats.org/drawingml/2006/main" xmlns:r="http://schemas.openxmlformats.org/officeDocument/2006/relationships" xmlns:p="http://schemas.openxmlformats.org/presentationml/2006/main" showMasterSp="0" showMasterPhAnim="0">
   <p:cSld>
     <p:spTree>
       <p:nvGrpSpPr>
-        <p:cNvPr id="1" name="Shape 131"/>
+        <p:cNvPr id="1" name="Shape 121"/>
         <p:cNvGrpSpPr/>
         <p:nvPr/>
       </p:nvGrpSpPr>
@@ -1192,7 +1388,7 @@
       </p:grpSpPr>
       <p:sp>
         <p:nvSpPr>
-          <p:cNvPr id="132" name="Shape 132"/>
+          <p:cNvPr id="122" name="Shape 122"/>
           <p:cNvSpPr>
             <a:spLocks noGrp="1" noRot="1" noChangeAspect="1"/>
           </p:cNvSpPr>
@@ -1202,8 +1398,8 @@
         </p:nvSpPr>
         <p:spPr>
           <a:xfrm>
-            <a:off x="1143225" y="685800"/>
-            <a:ext cx="4572299" cy="3429000"/>
+            <a:off x="1143000" y="685800"/>
+            <a:ext cx="4572000" cy="3429000"/>
           </a:xfrm>
           <a:custGeom>
             <a:avLst/>
@@ -1233,7 +1429,7 @@
       </p:sp>
       <p:sp>
         <p:nvSpPr>
-          <p:cNvPr id="133" name="Shape 133"/>
+          <p:cNvPr id="123" name="Shape 123"/>
           <p:cNvSpPr txBox="1">
             <a:spLocks noGrp="1"/>
           </p:cNvSpPr>
@@ -1257,6 +1453,16 @@
           <a:lstStyle/>
           <a:p>
             <a:endParaRPr/>
+          </a:p>
+          <a:p>
+            <a:r>
+              <a:t>----- Meeting Notes (13/06/13 20:56) -----</a:t>
+            </a:r>
+          </a:p>
+          <a:p>
+            <a:r>
+              <a:t>añadir el plan de cuadros en una filmina</a:t>
+            </a:r>
           </a:p>
         </p:txBody>
       </p:sp>
@@ -1268,12 +1474,12 @@
 </p:notes>
 </file>
 
-<file path=ppt/notesSlides/notesSlide17.xml><?xml version="1.0" encoding="utf-8"?>
+<file path=ppt/notesSlides/notesSlide19.xml><?xml version="1.0" encoding="utf-8"?>
 <p:notes xmlns:a="http://schemas.openxmlformats.org/drawingml/2006/main" xmlns:r="http://schemas.openxmlformats.org/officeDocument/2006/relationships" xmlns:p="http://schemas.openxmlformats.org/presentationml/2006/main" showMasterSp="0" showMasterPhAnim="0">
   <p:cSld>
     <p:spTree>
       <p:nvGrpSpPr>
-        <p:cNvPr id="1" name="Shape 138"/>
+        <p:cNvPr id="1" name="Shape 131"/>
         <p:cNvGrpSpPr/>
         <p:nvPr/>
       </p:nvGrpSpPr>
@@ -1287,7 +1493,7 @@
       </p:grpSpPr>
       <p:sp>
         <p:nvSpPr>
-          <p:cNvPr id="139" name="Shape 139"/>
+          <p:cNvPr id="132" name="Shape 132"/>
           <p:cNvSpPr>
             <a:spLocks noGrp="1" noRot="1" noChangeAspect="1"/>
           </p:cNvSpPr>
@@ -1328,7 +1534,7 @@
       </p:sp>
       <p:sp>
         <p:nvSpPr>
-          <p:cNvPr id="140" name="Shape 140"/>
+          <p:cNvPr id="133" name="Shape 133"/>
           <p:cNvSpPr txBox="1">
             <a:spLocks noGrp="1"/>
           </p:cNvSpPr>
@@ -1458,6 +1664,101 @@
 </p:notes>
 </file>
 
+<file path=ppt/notesSlides/notesSlide20.xml><?xml version="1.0" encoding="utf-8"?>
+<p:notes xmlns:a="http://schemas.openxmlformats.org/drawingml/2006/main" xmlns:r="http://schemas.openxmlformats.org/officeDocument/2006/relationships" xmlns:p="http://schemas.openxmlformats.org/presentationml/2006/main" showMasterSp="0" showMasterPhAnim="0">
+  <p:cSld>
+    <p:spTree>
+      <p:nvGrpSpPr>
+        <p:cNvPr id="1" name="Shape 138"/>
+        <p:cNvGrpSpPr/>
+        <p:nvPr/>
+      </p:nvGrpSpPr>
+      <p:grpSpPr>
+        <a:xfrm>
+          <a:off x="0" y="0"/>
+          <a:ext cx="0" cy="0"/>
+          <a:chOff x="0" y="0"/>
+          <a:chExt cx="0" cy="0"/>
+        </a:xfrm>
+      </p:grpSpPr>
+      <p:sp>
+        <p:nvSpPr>
+          <p:cNvPr id="139" name="Shape 139"/>
+          <p:cNvSpPr>
+            <a:spLocks noGrp="1" noRot="1" noChangeAspect="1"/>
+          </p:cNvSpPr>
+          <p:nvPr>
+            <p:ph type="sldImg" idx="2"/>
+          </p:nvPr>
+        </p:nvSpPr>
+        <p:spPr>
+          <a:xfrm>
+            <a:off x="1143225" y="685800"/>
+            <a:ext cx="4572299" cy="3429000"/>
+          </a:xfrm>
+          <a:custGeom>
+            <a:avLst/>
+            <a:gdLst/>
+            <a:ahLst/>
+            <a:cxnLst/>
+            <a:rect l="0" t="0" r="0" b="0"/>
+            <a:pathLst>
+              <a:path w="120000" h="120000" extrusionOk="0">
+                <a:moveTo>
+                  <a:pt x="0" y="0"/>
+                </a:moveTo>
+                <a:lnTo>
+                  <a:pt x="120000" y="0"/>
+                </a:lnTo>
+                <a:lnTo>
+                  <a:pt x="120000" y="120000"/>
+                </a:lnTo>
+                <a:lnTo>
+                  <a:pt x="0" y="120000"/>
+                </a:lnTo>
+                <a:close/>
+              </a:path>
+            </a:pathLst>
+          </a:custGeom>
+        </p:spPr>
+      </p:sp>
+      <p:sp>
+        <p:nvSpPr>
+          <p:cNvPr id="140" name="Shape 140"/>
+          <p:cNvSpPr txBox="1">
+            <a:spLocks noGrp="1"/>
+          </p:cNvSpPr>
+          <p:nvPr>
+            <p:ph type="body" idx="1"/>
+          </p:nvPr>
+        </p:nvSpPr>
+        <p:spPr>
+          <a:xfrm>
+            <a:off x="685800" y="4343400"/>
+            <a:ext cx="5486399" cy="4114800"/>
+          </a:xfrm>
+          <a:prstGeom prst="rect">
+            <a:avLst/>
+          </a:prstGeom>
+        </p:spPr>
+        <p:txBody>
+          <a:bodyPr lIns="91425" tIns="91425" rIns="91425" bIns="91425" anchor="t" anchorCtr="0">
+            <a:noAutofit/>
+          </a:bodyPr>
+          <a:lstStyle/>
+          <a:p>
+            <a:endParaRPr/>
+          </a:p>
+        </p:txBody>
+      </p:sp>
+    </p:spTree>
+  </p:cSld>
+  <p:clrMapOvr>
+    <a:masterClrMapping/>
+  </p:clrMapOvr>
+</p:notes>
+</file>
+
 <file path=ppt/notesSlides/notesSlide3.xml><?xml version="1.0" encoding="utf-8"?>
 <p:notes xmlns:a="http://schemas.openxmlformats.org/drawingml/2006/main" xmlns:r="http://schemas.openxmlformats.org/officeDocument/2006/relationships" xmlns:p="http://schemas.openxmlformats.org/presentationml/2006/main" showMasterSp="0" showMasterPhAnim="0">
   <p:cSld>
@@ -1677,8 +1978,8 @@
         </p:nvSpPr>
         <p:spPr>
           <a:xfrm>
-            <a:off x="1143225" y="685800"/>
-            <a:ext cx="4572299" cy="3429000"/>
+            <a:off x="1143000" y="685800"/>
+            <a:ext cx="4572000" cy="3429000"/>
           </a:xfrm>
           <a:custGeom>
             <a:avLst/>
@@ -1732,6 +2033,18 @@
           <a:lstStyle/>
           <a:p>
             <a:endParaRPr/>
+          </a:p>
+          <a:p>
+            <a:r>
+              <a:rPr/>
+              <a:t>----- Meeting Notes (27/06/13 21:27) -----</a:t>
+            </a:r>
+          </a:p>
+          <a:p>
+            <a:r>
+              <a:rPr/>
+              <a:t>aclarar fuerte que no lo hacemos</a:t>
+            </a:r>
           </a:p>
         </p:txBody>
       </p:sp>
@@ -2029,11 +2342,11 @@
 </file>
 
 <file path=ppt/notesSlides/notesSlide9.xml><?xml version="1.0" encoding="utf-8"?>
-<p:notes xmlns:a="http://schemas.openxmlformats.org/drawingml/2006/main" xmlns:r="http://schemas.openxmlformats.org/officeDocument/2006/relationships" xmlns:p="http://schemas.openxmlformats.org/presentationml/2006/main" showMasterSp="0" showMasterPhAnim="0">
+<p:notes xmlns:a="http://schemas.openxmlformats.org/drawingml/2006/main" xmlns:r="http://schemas.openxmlformats.org/officeDocument/2006/relationships" xmlns:p="http://schemas.openxmlformats.org/presentationml/2006/main">
   <p:cSld>
     <p:spTree>
       <p:nvGrpSpPr>
-        <p:cNvPr id="1" name="Shape 84"/>
+        <p:cNvPr id="1" name=""/>
         <p:cNvGrpSpPr/>
         <p:nvPr/>
       </p:nvGrpSpPr>
@@ -2047,75 +2360,59 @@
       </p:grpSpPr>
       <p:sp>
         <p:nvSpPr>
-          <p:cNvPr id="85" name="Shape 85"/>
+          <p:cNvPr id="2" name="Slide Image Placeholder 1"/>
           <p:cNvSpPr>
             <a:spLocks noGrp="1" noRot="1" noChangeAspect="1"/>
           </p:cNvSpPr>
           <p:nvPr>
-            <p:ph type="sldImg" idx="2"/>
+            <p:ph type="sldImg"/>
           </p:nvPr>
         </p:nvSpPr>
-        <p:spPr>
-          <a:xfrm>
-            <a:off x="1143225" y="685800"/>
-            <a:ext cx="4572299" cy="3429000"/>
-          </a:xfrm>
-          <a:custGeom>
-            <a:avLst/>
-            <a:gdLst/>
-            <a:ahLst/>
-            <a:cxnLst/>
-            <a:rect l="0" t="0" r="0" b="0"/>
-            <a:pathLst>
-              <a:path w="120000" h="120000" extrusionOk="0">
-                <a:moveTo>
-                  <a:pt x="0" y="0"/>
-                </a:moveTo>
-                <a:lnTo>
-                  <a:pt x="120000" y="0"/>
-                </a:lnTo>
-                <a:lnTo>
-                  <a:pt x="120000" y="120000"/>
-                </a:lnTo>
-                <a:lnTo>
-                  <a:pt x="0" y="120000"/>
-                </a:lnTo>
-                <a:close/>
-              </a:path>
-            </a:pathLst>
-          </a:custGeom>
-        </p:spPr>
-      </p:sp>
-      <p:sp>
-        <p:nvSpPr>
-          <p:cNvPr id="86" name="Shape 86"/>
-          <p:cNvSpPr txBox="1">
+        <p:spPr/>
+      </p:sp>
+      <p:sp>
+        <p:nvSpPr>
+          <p:cNvPr id="3" name="Notes Placeholder 2"/>
+          <p:cNvSpPr>
             <a:spLocks noGrp="1"/>
           </p:cNvSpPr>
           <p:nvPr>
             <p:ph type="body" idx="1"/>
           </p:nvPr>
         </p:nvSpPr>
-        <p:spPr>
-          <a:xfrm>
-            <a:off x="685800" y="4343400"/>
-            <a:ext cx="5486399" cy="4114800"/>
-          </a:xfrm>
-          <a:prstGeom prst="rect">
-            <a:avLst/>
-          </a:prstGeom>
-        </p:spPr>
+        <p:spPr/>
         <p:txBody>
-          <a:bodyPr lIns="91425" tIns="91425" rIns="91425" bIns="91425" anchor="t" anchorCtr="0">
-            <a:noAutofit/>
-          </a:bodyPr>
+          <a:bodyPr/>
           <a:lstStyle/>
           <a:p>
-            <a:endParaRPr dirty="0"/>
+            <a:endParaRPr lang="en-US"/>
+          </a:p>
+          <a:p>
+            <a:r>
+              <a:rPr lang="en-US"/>
+              <a:t>----- Meeting Notes (27/06/13 21:27) -----</a:t>
+            </a:r>
+          </a:p>
+          <a:p>
+            <a:r>
+              <a:rPr lang="en-US"/>
+              <a:t>poner despues de explicar estrategias</a:t>
+            </a:r>
+          </a:p>
+          <a:p>
+            <a:r>
+              <a:rPr lang="en-US"/>
+              <a:t>cambiar 1 y 2 por nombre directo</a:t>
+            </a:r>
           </a:p>
         </p:txBody>
       </p:sp>
     </p:spTree>
+    <p:extLst>
+      <p:ext uri="{BB962C8B-B14F-4D97-AF65-F5344CB8AC3E}">
+        <p14:creationId xmlns:p14="http://schemas.microsoft.com/office/powerpoint/2010/main" val="3102552380"/>
+      </p:ext>
+    </p:extLst>
   </p:cSld>
   <p:clrMapOvr>
     <a:masterClrMapping/>
@@ -5013,16 +5310,55 @@
           </a:bodyPr>
           <a:lstStyle/>
           <a:p>
-            <a:pPr lvl="0" rtl="0">
+            <a:pPr marL="0" lvl="0" indent="0" rtl="0">
+              <a:buSzPct val="100000"/>
               <a:buNone/>
             </a:pPr>
-            <a:r>
-              <a:rPr lang="en" dirty="0"/>
-              <a:t>Tienen 2 </a:t>
-            </a:r>
-            <a:r>
-              <a:rPr lang="en" dirty="0" smtClean="0"/>
-              <a:t>criterios:</a:t>
+            <a:endParaRPr lang="es-ES_tradnl" sz="3200" dirty="0" smtClean="0"/>
+          </a:p>
+          <a:p>
+            <a:pPr marL="0" lvl="0" indent="0" rtl="0">
+              <a:buSzPct val="100000"/>
+              <a:buNone/>
+            </a:pPr>
+            <a:r>
+              <a:rPr lang="es-ES_tradnl" sz="3200" dirty="0" smtClean="0"/>
+              <a:t>M</a:t>
+            </a:r>
+            <a:r>
+              <a:rPr lang="es-ES_tradnl" sz="3200" dirty="0" smtClean="0"/>
+              <a:t>ayor Precio / Hora</a:t>
+            </a:r>
+          </a:p>
+          <a:p>
+            <a:pPr marL="914400" lvl="1" indent="-514350"/>
+            <a:r>
+              <a:rPr lang="es-ES_tradnl" dirty="0" smtClean="0"/>
+              <a:t>Desempate por mayor cantidad de Horas Hombre</a:t>
+            </a:r>
+          </a:p>
+          <a:p>
+            <a:pPr marL="914400" lvl="1" indent="-514350"/>
+            <a:endParaRPr lang="es-ES_tradnl" sz="3200" dirty="0" smtClean="0"/>
+          </a:p>
+          <a:p>
+            <a:pPr marL="0" indent="0">
+              <a:buNone/>
+            </a:pPr>
+            <a:r>
+              <a:rPr lang="es-ES_tradnl" sz="3200" dirty="0" smtClean="0"/>
+              <a:t>Mayor Facturaci</a:t>
+            </a:r>
+            <a:r>
+              <a:rPr lang="es-ES_tradnl" sz="3200" dirty="0" smtClean="0"/>
+              <a:t>ón</a:t>
+            </a:r>
+          </a:p>
+          <a:p>
+            <a:pPr marL="914400" lvl="1" indent="-514350"/>
+            <a:r>
+              <a:rPr lang="es-ES_tradnl" dirty="0" smtClean="0"/>
+              <a:t>Desempate por Precio / Hora más alto</a:t>
             </a:r>
             <a:endParaRPr lang="es-ES_tradnl" dirty="0" smtClean="0"/>
           </a:p>
@@ -5032,78 +5368,7 @@
               <a:buFont typeface="+mj-lt"/>
               <a:buAutoNum type="arabicPeriod"/>
             </a:pPr>
-            <a:r>
-              <a:rPr lang="es-ES_tradnl" dirty="0"/>
-              <a:t> </a:t>
-            </a:r>
-            <a:r>
-              <a:rPr lang="es-ES_tradnl" dirty="0" smtClean="0"/>
-              <a:t>Para ordenar de mayor a menor</a:t>
-            </a:r>
-          </a:p>
-          <a:p>
-            <a:pPr marL="514350" lvl="0" indent="-514350" rtl="0">
-              <a:buSzPct val="100000"/>
-              <a:buFont typeface="+mj-lt"/>
-              <a:buAutoNum type="arabicPeriod"/>
-            </a:pPr>
-            <a:r>
-              <a:rPr lang="es-ES_tradnl" dirty="0" smtClean="0"/>
-              <a:t> Para desempatar</a:t>
-            </a:r>
-          </a:p>
-          <a:p>
-            <a:pPr marL="514350" lvl="0" indent="-514350" rtl="0">
-              <a:buFont typeface="+mj-lt"/>
-              <a:buAutoNum type="arabicPeriod"/>
-            </a:pPr>
             <a:endParaRPr lang="es-ES_tradnl" dirty="0" smtClean="0"/>
-          </a:p>
-          <a:p>
-            <a:pPr marL="0" lvl="0" indent="0" rtl="0">
-              <a:buNone/>
-            </a:pPr>
-            <a:endParaRPr lang="en" dirty="0"/>
-          </a:p>
-          <a:p>
-            <a:pPr marL="457200" lvl="0" indent="-419100" algn="ctr" rtl="0">
-              <a:buClr>
-                <a:srgbClr val="000000"/>
-              </a:buClr>
-              <a:buSzPct val="166666"/>
-              <a:buFont typeface="Arial"/>
-              <a:buChar char="•"/>
-            </a:pPr>
-            <a:r>
-              <a:rPr lang="en" dirty="0"/>
-              <a:t>Precio/hora </a:t>
-            </a:r>
-            <a:r>
-              <a:rPr lang="en-US" dirty="0" smtClean="0"/>
-              <a:t>-</a:t>
-            </a:r>
-            <a:r>
-              <a:rPr lang="en" dirty="0" smtClean="0"/>
-              <a:t> Horas</a:t>
-            </a:r>
-            <a:endParaRPr lang="en" dirty="0"/>
-          </a:p>
-          <a:p>
-            <a:pPr marL="457200" lvl="0" indent="-419100" algn="ctr" rtl="0">
-              <a:buClr>
-                <a:srgbClr val="000000"/>
-              </a:buClr>
-              <a:buSzPct val="166666"/>
-              <a:buFont typeface="Arial"/>
-              <a:buChar char="•"/>
-            </a:pPr>
-            <a:r>
-              <a:rPr lang="en" dirty="0"/>
-              <a:t>Facturación - Precio/hora</a:t>
-            </a:r>
-          </a:p>
-          <a:p>
-            <a:endParaRPr lang="en" dirty="0"/>
           </a:p>
         </p:txBody>
       </p:sp>
@@ -5265,8 +5530,8 @@
               <a:t>Los proyectos mejores que el 80% percentil </a:t>
             </a:r>
             <a:r>
-              <a:rPr lang="es-ES_tradnl" dirty="0" err="1" smtClean="0"/>
-              <a:t>historico</a:t>
+              <a:rPr lang="es-ES_tradnl" dirty="0" smtClean="0"/>
+              <a:t>histórico</a:t>
             </a:r>
             <a:endParaRPr lang="en" dirty="0"/>
           </a:p>
@@ -5527,7 +5792,23 @@
             </a:pPr>
             <a:r>
               <a:rPr lang="en" dirty="0"/>
-              <a:t>Cantidad de proyectos por mes. P(3</a:t>
+              <a:t>Cantidad de proyectos por mes. </a:t>
+            </a:r>
+            <a:r>
+              <a:rPr lang="en" dirty="0" smtClean="0"/>
+              <a:t>P</a:t>
+            </a:r>
+            <a:r>
+              <a:rPr lang="es-ES_tradnl" dirty="0" err="1" smtClean="0"/>
+              <a:t>oisson</a:t>
+            </a:r>
+            <a:r>
+              <a:rPr lang="es-ES_tradnl" dirty="0"/>
+              <a:t>(</a:t>
+            </a:r>
+            <a:r>
+              <a:rPr lang="en" dirty="0" smtClean="0"/>
+              <a:t>3</a:t>
             </a:r>
             <a:r>
               <a:rPr lang="en" dirty="0" smtClean="0"/>
@@ -5618,7 +5899,7 @@
           <a:p>
             <a:r>
               <a:rPr lang="en" dirty="0" smtClean="0"/>
-              <a:t>Tipo de proyecto. U(10%/75%/15%)</a:t>
+              <a:t>Tipo de proyecto. </a:t>
             </a:r>
             <a:endParaRPr lang="en-US" dirty="0"/>
           </a:p>
@@ -5649,9 +5930,30 @@
               <a:buNone/>
             </a:pPr>
             <a:r>
-              <a:rPr lang="en" dirty="0" smtClean="0"/>
-              <a:t>Tamaño de proyecto. Triangular</a:t>
-            </a:r>
+              <a:rPr lang="es-ES_tradnl" sz="2000" dirty="0" smtClean="0"/>
+              <a:t>Uniforme Chico = </a:t>
+            </a:r>
+            <a:r>
+              <a:rPr lang="en" sz="2000" dirty="0" smtClean="0"/>
+              <a:t>10%</a:t>
+            </a:r>
+            <a:r>
+              <a:rPr lang="es-ES_tradnl" sz="2000" dirty="0" smtClean="0"/>
+              <a:t> Mediano = </a:t>
+            </a:r>
+            <a:r>
+              <a:rPr lang="en" sz="2000" dirty="0" smtClean="0"/>
+              <a:t>75%</a:t>
+            </a:r>
+            <a:r>
+              <a:rPr lang="es-ES_tradnl" sz="2000" dirty="0" smtClean="0"/>
+              <a:t> Grande = </a:t>
+            </a:r>
+            <a:r>
+              <a:rPr lang="en" sz="2000" dirty="0" smtClean="0"/>
+              <a:t>15%</a:t>
+            </a:r>
+            <a:endParaRPr lang="en" sz="2000" dirty="0" smtClean="0"/>
           </a:p>
           <a:p>
             <a:pPr lvl="1">
@@ -5673,7 +5975,7 @@
           <p:nvPr/>
         </p:nvPicPr>
         <p:blipFill>
-          <a:blip r:embed="rId2"/>
+          <a:blip r:embed="rId3"/>
           <a:stretch>
             <a:fillRect/>
           </a:stretch>
@@ -5693,6 +5995,13 @@
   <p:clrMapOvr>
     <a:masterClrMapping/>
   </p:clrMapOvr>
+  <p:timing>
+    <p:tnLst>
+      <p:par>
+        <p:cTn xmlns:p14="http://schemas.microsoft.com/office/powerpoint/2010/main" id="1" dur="indefinite" restart="never" nodeType="tmRoot"/>
+      </p:par>
+    </p:tnLst>
+  </p:timing>
 </p:sld>
 </file>
 
@@ -5791,26 +6100,86 @@
           <p:nvPr/>
         </p:nvPicPr>
         <p:blipFill>
-          <a:blip r:embed="rId2"/>
+          <a:blip r:embed="rId3"/>
           <a:stretch>
             <a:fillRect/>
           </a:stretch>
         </p:blipFill>
         <p:spPr>
           <a:xfrm>
-            <a:off x="730250" y="869369"/>
-            <a:ext cx="7358919" cy="5619538"/>
+            <a:off x="1064746" y="1424353"/>
+            <a:ext cx="6689926" cy="5108671"/>
           </a:xfrm>
           <a:prstGeom prst="rect">
             <a:avLst/>
           </a:prstGeom>
         </p:spPr>
       </p:pic>
+      <p:sp>
+        <p:nvSpPr>
+          <p:cNvPr id="2" name="TextBox 1"/>
+          <p:cNvSpPr txBox="1"/>
+          <p:nvPr/>
+        </p:nvSpPr>
+        <p:spPr>
+          <a:xfrm>
+            <a:off x="1064746" y="774008"/>
+            <a:ext cx="5323843" cy="584776"/>
+          </a:xfrm>
+          <a:prstGeom prst="rect">
+            <a:avLst/>
+          </a:prstGeom>
+          <a:noFill/>
+        </p:spPr>
+        <p:txBody>
+          <a:bodyPr wrap="none" rtlCol="0">
+            <a:spAutoFit/>
+          </a:bodyPr>
+          <a:lstStyle/>
+          <a:p>
+            <a:r>
+              <a:rPr lang="en-US" sz="1800" dirty="0" smtClean="0"/>
+              <a:t>Triangular  Min = </a:t>
+            </a:r>
+            <a:r>
+              <a:rPr lang="en-US" sz="1800" dirty="0"/>
+              <a:t>4500 </a:t>
+            </a:r>
+            <a:r>
+              <a:rPr lang="en-US" sz="1800" dirty="0" smtClean="0"/>
+              <a:t> Max = 8000  </a:t>
+            </a:r>
+            <a:r>
+              <a:rPr lang="en-US" sz="1800" dirty="0" err="1" smtClean="0"/>
+              <a:t>Moda</a:t>
+            </a:r>
+            <a:r>
+              <a:rPr lang="en-US" sz="1800" dirty="0" smtClean="0"/>
+              <a:t> = 5300</a:t>
+            </a:r>
+            <a:endParaRPr lang="en-US" sz="1800" dirty="0"/>
+          </a:p>
+          <a:p>
+            <a:r>
+              <a:rPr lang="en-US" dirty="0" smtClean="0"/>
+              <a:t> </a:t>
+            </a:r>
+            <a:endParaRPr lang="en-US" dirty="0"/>
+          </a:p>
+        </p:txBody>
+      </p:sp>
     </p:spTree>
   </p:cSld>
   <p:clrMapOvr>
     <a:masterClrMapping/>
   </p:clrMapOvr>
+  <p:timing>
+    <p:tnLst>
+      <p:par>
+        <p:cTn xmlns:p14="http://schemas.microsoft.com/office/powerpoint/2010/main" id="1" dur="indefinite" restart="never" nodeType="tmRoot"/>
+      </p:par>
+    </p:tnLst>
+  </p:timing>
 </p:sld>
 </file>
 
@@ -5916,19 +6285,71 @@
         </p:blipFill>
         <p:spPr>
           <a:xfrm>
-            <a:off x="571500" y="750044"/>
-            <a:ext cx="8001000" cy="5753100"/>
+            <a:off x="935182" y="1359027"/>
+            <a:ext cx="7273636" cy="5230091"/>
           </a:xfrm>
           <a:prstGeom prst="rect">
             <a:avLst/>
           </a:prstGeom>
         </p:spPr>
       </p:pic>
+      <p:sp>
+        <p:nvSpPr>
+          <p:cNvPr id="4" name="TextBox 3"/>
+          <p:cNvSpPr txBox="1"/>
+          <p:nvPr/>
+        </p:nvSpPr>
+        <p:spPr>
+          <a:xfrm>
+            <a:off x="1064746" y="774008"/>
+            <a:ext cx="5388089" cy="584776"/>
+          </a:xfrm>
+          <a:prstGeom prst="rect">
+            <a:avLst/>
+          </a:prstGeom>
+          <a:noFill/>
+        </p:spPr>
+        <p:txBody>
+          <a:bodyPr wrap="none" rtlCol="0">
+            <a:spAutoFit/>
+          </a:bodyPr>
+          <a:lstStyle/>
+          <a:p>
+            <a:r>
+              <a:rPr lang="en-US" sz="1800" dirty="0" smtClean="0"/>
+              <a:t>Triangular  Min = 2000 Max = 4500  </a:t>
+            </a:r>
+            <a:r>
+              <a:rPr lang="en-US" sz="1800" dirty="0" err="1" smtClean="0"/>
+              <a:t>Moda</a:t>
+            </a:r>
+            <a:r>
+              <a:rPr lang="en-US" sz="1800" dirty="0" smtClean="0"/>
+              <a:t> = 3200</a:t>
+            </a:r>
+            <a:endParaRPr lang="en-US" sz="1800" dirty="0"/>
+          </a:p>
+          <a:p>
+            <a:r>
+              <a:rPr lang="en-US" dirty="0" smtClean="0"/>
+              <a:t> </a:t>
+            </a:r>
+            <a:endParaRPr lang="en-US" dirty="0"/>
+          </a:p>
+        </p:txBody>
+      </p:sp>
     </p:spTree>
   </p:cSld>
   <p:clrMapOvr>
     <a:masterClrMapping/>
   </p:clrMapOvr>
+  <p:timing>
+    <p:tnLst>
+      <p:par>
+        <p:cTn xmlns:p14="http://schemas.microsoft.com/office/powerpoint/2010/main" id="1" dur="indefinite" restart="never" nodeType="tmRoot"/>
+      </p:par>
+    </p:tnLst>
+  </p:timing>
 </p:sld>
 </file>
 
@@ -6034,19 +6455,71 @@
         </p:blipFill>
         <p:spPr>
           <a:xfrm>
-            <a:off x="641350" y="750044"/>
-            <a:ext cx="7861300" cy="5994400"/>
+            <a:off x="998682" y="1250175"/>
+            <a:ext cx="7146636" cy="5449455"/>
           </a:xfrm>
           <a:prstGeom prst="rect">
             <a:avLst/>
           </a:prstGeom>
         </p:spPr>
       </p:pic>
+      <p:sp>
+        <p:nvSpPr>
+          <p:cNvPr id="4" name="TextBox 3"/>
+          <p:cNvSpPr txBox="1"/>
+          <p:nvPr/>
+        </p:nvSpPr>
+        <p:spPr>
+          <a:xfrm>
+            <a:off x="1064746" y="774008"/>
+            <a:ext cx="5323843" cy="584776"/>
+          </a:xfrm>
+          <a:prstGeom prst="rect">
+            <a:avLst/>
+          </a:prstGeom>
+          <a:noFill/>
+        </p:spPr>
+        <p:txBody>
+          <a:bodyPr wrap="none" rtlCol="0">
+            <a:spAutoFit/>
+          </a:bodyPr>
+          <a:lstStyle/>
+          <a:p>
+            <a:r>
+              <a:rPr lang="en-US" sz="1800" dirty="0" smtClean="0"/>
+              <a:t>Triangular  Min = 500  Max = 3200  </a:t>
+            </a:r>
+            <a:r>
+              <a:rPr lang="en-US" sz="1800" dirty="0" err="1" smtClean="0"/>
+              <a:t>Moda</a:t>
+            </a:r>
+            <a:r>
+              <a:rPr lang="en-US" sz="1800" dirty="0" smtClean="0"/>
+              <a:t> = 2000</a:t>
+            </a:r>
+            <a:endParaRPr lang="en-US" sz="1800" dirty="0"/>
+          </a:p>
+          <a:p>
+            <a:r>
+              <a:rPr lang="en-US" dirty="0" smtClean="0"/>
+              <a:t> </a:t>
+            </a:r>
+            <a:endParaRPr lang="en-US" dirty="0"/>
+          </a:p>
+        </p:txBody>
+      </p:sp>
     </p:spTree>
   </p:cSld>
   <p:clrMapOvr>
     <a:masterClrMapping/>
   </p:clrMapOvr>
+  <p:timing>
+    <p:tnLst>
+      <p:par>
+        <p:cTn xmlns:p14="http://schemas.microsoft.com/office/powerpoint/2010/main" id="1" dur="indefinite" restart="never" nodeType="tmRoot"/>
+      </p:par>
+    </p:tnLst>
+  </p:timing>
 </p:sld>
 </file>
 
@@ -6157,19 +6630,71 @@
         </p:blipFill>
         <p:spPr>
           <a:xfrm>
-            <a:off x="635000" y="743687"/>
-            <a:ext cx="7874000" cy="5816600"/>
+            <a:off x="992909" y="1343574"/>
+            <a:ext cx="7158182" cy="5287818"/>
           </a:xfrm>
           <a:prstGeom prst="rect">
             <a:avLst/>
           </a:prstGeom>
         </p:spPr>
       </p:pic>
+      <p:sp>
+        <p:nvSpPr>
+          <p:cNvPr id="4" name="TextBox 3"/>
+          <p:cNvSpPr txBox="1"/>
+          <p:nvPr/>
+        </p:nvSpPr>
+        <p:spPr>
+          <a:xfrm>
+            <a:off x="1064746" y="774008"/>
+            <a:ext cx="4938709" cy="584776"/>
+          </a:xfrm>
+          <a:prstGeom prst="rect">
+            <a:avLst/>
+          </a:prstGeom>
+          <a:noFill/>
+        </p:spPr>
+        <p:txBody>
+          <a:bodyPr wrap="none" rtlCol="0">
+            <a:spAutoFit/>
+          </a:bodyPr>
+          <a:lstStyle/>
+          <a:p>
+            <a:r>
+              <a:rPr lang="en-US" sz="1800" dirty="0" smtClean="0"/>
+              <a:t>Triangular  Min = 180  Max = 310  </a:t>
+            </a:r>
+            <a:r>
+              <a:rPr lang="en-US" sz="1800" dirty="0" err="1" smtClean="0"/>
+              <a:t>Moda</a:t>
+            </a:r>
+            <a:r>
+              <a:rPr lang="en-US" sz="1800" dirty="0" smtClean="0"/>
+              <a:t> = 230  </a:t>
+            </a:r>
+            <a:endParaRPr lang="en-US" sz="1800" dirty="0"/>
+          </a:p>
+          <a:p>
+            <a:r>
+              <a:rPr lang="en-US" dirty="0" smtClean="0"/>
+              <a:t> </a:t>
+            </a:r>
+            <a:endParaRPr lang="en-US" dirty="0"/>
+          </a:p>
+        </p:txBody>
+      </p:sp>
     </p:spTree>
   </p:cSld>
   <p:clrMapOvr>
     <a:masterClrMapping/>
   </p:clrMapOvr>
+  <p:timing>
+    <p:tnLst>
+      <p:par>
+        <p:cTn xmlns:p14="http://schemas.microsoft.com/office/powerpoint/2010/main" id="1" dur="indefinite" restart="never" nodeType="tmRoot"/>
+      </p:par>
+    </p:tnLst>
+  </p:timing>
 </p:sld>
 </file>
 
@@ -6535,19 +7060,71 @@
         </p:blipFill>
         <p:spPr>
           <a:xfrm>
-            <a:off x="673100" y="799424"/>
-            <a:ext cx="7797800" cy="5956300"/>
+            <a:off x="1027546" y="1273859"/>
+            <a:ext cx="7088909" cy="5414818"/>
           </a:xfrm>
           <a:prstGeom prst="rect">
             <a:avLst/>
           </a:prstGeom>
         </p:spPr>
       </p:pic>
+      <p:sp>
+        <p:nvSpPr>
+          <p:cNvPr id="5" name="TextBox 4"/>
+          <p:cNvSpPr txBox="1"/>
+          <p:nvPr/>
+        </p:nvSpPr>
+        <p:spPr>
+          <a:xfrm>
+            <a:off x="1064746" y="774008"/>
+            <a:ext cx="4938709" cy="584776"/>
+          </a:xfrm>
+          <a:prstGeom prst="rect">
+            <a:avLst/>
+          </a:prstGeom>
+          <a:noFill/>
+        </p:spPr>
+        <p:txBody>
+          <a:bodyPr wrap="none" rtlCol="0">
+            <a:spAutoFit/>
+          </a:bodyPr>
+          <a:lstStyle/>
+          <a:p>
+            <a:r>
+              <a:rPr lang="en-US" sz="1800" dirty="0" smtClean="0"/>
+              <a:t>Triangular  Min = 200  Max = 240  </a:t>
+            </a:r>
+            <a:r>
+              <a:rPr lang="en-US" sz="1800" dirty="0" err="1" smtClean="0"/>
+              <a:t>Moda</a:t>
+            </a:r>
+            <a:r>
+              <a:rPr lang="en-US" sz="1800" dirty="0" smtClean="0"/>
+              <a:t> = 230</a:t>
+            </a:r>
+            <a:endParaRPr lang="en-US" sz="1800" dirty="0"/>
+          </a:p>
+          <a:p>
+            <a:r>
+              <a:rPr lang="en-US" dirty="0" smtClean="0"/>
+              <a:t> </a:t>
+            </a:r>
+            <a:endParaRPr lang="en-US" dirty="0"/>
+          </a:p>
+        </p:txBody>
+      </p:sp>
     </p:spTree>
   </p:cSld>
   <p:clrMapOvr>
     <a:masterClrMapping/>
   </p:clrMapOvr>
+  <p:timing>
+    <p:tnLst>
+      <p:par>
+        <p:cTn xmlns:p14="http://schemas.microsoft.com/office/powerpoint/2010/main" id="1" dur="indefinite" restart="never" nodeType="tmRoot"/>
+      </p:par>
+    </p:tnLst>
+  </p:timing>
 </p:sld>
 </file>
 
@@ -6658,19 +7235,71 @@
         </p:blipFill>
         <p:spPr>
           <a:xfrm>
-            <a:off x="654050" y="878845"/>
-            <a:ext cx="7835900" cy="5867400"/>
+            <a:off x="1010228" y="1373203"/>
+            <a:ext cx="7123545" cy="5334000"/>
           </a:xfrm>
           <a:prstGeom prst="rect">
             <a:avLst/>
           </a:prstGeom>
         </p:spPr>
       </p:pic>
+      <p:sp>
+        <p:nvSpPr>
+          <p:cNvPr id="5" name="TextBox 4"/>
+          <p:cNvSpPr txBox="1"/>
+          <p:nvPr/>
+        </p:nvSpPr>
+        <p:spPr>
+          <a:xfrm>
+            <a:off x="1064746" y="774008"/>
+            <a:ext cx="4938709" cy="584776"/>
+          </a:xfrm>
+          <a:prstGeom prst="rect">
+            <a:avLst/>
+          </a:prstGeom>
+          <a:noFill/>
+        </p:spPr>
+        <p:txBody>
+          <a:bodyPr wrap="none" rtlCol="0">
+            <a:spAutoFit/>
+          </a:bodyPr>
+          <a:lstStyle/>
+          <a:p>
+            <a:r>
+              <a:rPr lang="en-US" sz="1800" dirty="0" smtClean="0"/>
+              <a:t>Triangular  Min = 200  Max = 300  </a:t>
+            </a:r>
+            <a:r>
+              <a:rPr lang="en-US" sz="1800" dirty="0" err="1" smtClean="0"/>
+              <a:t>Moda</a:t>
+            </a:r>
+            <a:r>
+              <a:rPr lang="en-US" sz="1800" dirty="0" smtClean="0"/>
+              <a:t> = 290</a:t>
+            </a:r>
+            <a:endParaRPr lang="en-US" sz="1800" dirty="0"/>
+          </a:p>
+          <a:p>
+            <a:r>
+              <a:rPr lang="en-US" dirty="0" smtClean="0"/>
+              <a:t> </a:t>
+            </a:r>
+            <a:endParaRPr lang="en-US" dirty="0"/>
+          </a:p>
+        </p:txBody>
+      </p:sp>
     </p:spTree>
   </p:cSld>
   <p:clrMapOvr>
     <a:masterClrMapping/>
   </p:clrMapOvr>
+  <p:timing>
+    <p:tnLst>
+      <p:par>
+        <p:cTn xmlns:p14="http://schemas.microsoft.com/office/powerpoint/2010/main" id="1" dur="indefinite" restart="never" nodeType="tmRoot"/>
+      </p:par>
+    </p:tnLst>
+  </p:timing>
 </p:sld>
 </file>
 
@@ -6759,6 +7388,13 @@
   <p:clrMapOvr>
     <a:masterClrMapping/>
   </p:clrMapOvr>
+  <p:timing>
+    <p:tnLst>
+      <p:par>
+        <p:cTn xmlns:p14="http://schemas.microsoft.com/office/powerpoint/2010/main" id="1" dur="indefinite" restart="never" nodeType="tmRoot"/>
+      </p:par>
+    </p:tnLst>
+  </p:timing>
 </p:sld>
 </file>
 
@@ -7345,6 +7981,13 @@
   <p:clrMapOvr>
     <a:masterClrMapping/>
   </p:clrMapOvr>
+  <p:timing>
+    <p:tnLst>
+      <p:par>
+        <p:cTn xmlns:p14="http://schemas.microsoft.com/office/powerpoint/2010/main" id="1" dur="indefinite" restart="never" nodeType="tmRoot"/>
+      </p:par>
+    </p:tnLst>
+  </p:timing>
 </p:sld>
 </file>
 
@@ -7543,6 +8186,13 @@
   <p:clrMapOvr>
     <a:masterClrMapping/>
   </p:clrMapOvr>
+  <p:timing>
+    <p:tnLst>
+      <p:par>
+        <p:cTn xmlns:p14="http://schemas.microsoft.com/office/powerpoint/2010/main" id="1" dur="indefinite" restart="never" nodeType="tmRoot"/>
+      </p:par>
+    </p:tnLst>
+  </p:timing>
 </p:sld>
 </file>
 
@@ -7709,6 +8359,13 @@
   <p:clrMapOvr>
     <a:masterClrMapping/>
   </p:clrMapOvr>
+  <p:timing>
+    <p:tnLst>
+      <p:par>
+        <p:cTn xmlns:p14="http://schemas.microsoft.com/office/powerpoint/2010/main" id="1" dur="indefinite" restart="never" nodeType="tmRoot"/>
+      </p:par>
+    </p:tnLst>
+  </p:timing>
 </p:sld>
 </file>
 
@@ -7839,6 +8496,13 @@
   <p:clrMapOvr>
     <a:masterClrMapping/>
   </p:clrMapOvr>
+  <p:timing>
+    <p:tnLst>
+      <p:par>
+        <p:cTn xmlns:p14="http://schemas.microsoft.com/office/powerpoint/2010/main" id="1" dur="indefinite" restart="never" nodeType="tmRoot"/>
+      </p:par>
+    </p:tnLst>
+  </p:timing>
 </p:sld>
 </file>
 
@@ -7888,6 +8552,13 @@
   <p:clrMapOvr>
     <a:masterClrMapping/>
   </p:clrMapOvr>
+  <p:timing>
+    <p:tnLst>
+      <p:par>
+        <p:cTn xmlns:p14="http://schemas.microsoft.com/office/powerpoint/2010/main" id="1" dur="indefinite" restart="never" nodeType="tmRoot"/>
+      </p:par>
+    </p:tnLst>
+  </p:timing>
 </p:sld>
 </file>
 
@@ -8173,6 +8844,13 @@
   <p:clrMapOvr>
     <a:masterClrMapping/>
   </p:clrMapOvr>
+  <p:timing>
+    <p:tnLst>
+      <p:par>
+        <p:cTn xmlns:p14="http://schemas.microsoft.com/office/powerpoint/2010/main" id="1" dur="indefinite" restart="never" nodeType="tmRoot"/>
+      </p:par>
+    </p:tnLst>
+  </p:timing>
 </p:sld>
 </file>
 
@@ -8222,6 +8900,13 @@
   <p:clrMapOvr>
     <a:masterClrMapping/>
   </p:clrMapOvr>
+  <p:timing>
+    <p:tnLst>
+      <p:par>
+        <p:cTn xmlns:p14="http://schemas.microsoft.com/office/powerpoint/2010/main" id="1" dur="indefinite" restart="never" nodeType="tmRoot"/>
+      </p:par>
+    </p:tnLst>
+  </p:timing>
 </p:sld>
 </file>
 
@@ -8477,6 +9162,13 @@
   <p:clrMapOvr>
     <a:masterClrMapping/>
   </p:clrMapOvr>
+  <p:timing>
+    <p:tnLst>
+      <p:par>
+        <p:cTn xmlns:p14="http://schemas.microsoft.com/office/powerpoint/2010/main" id="1" dur="indefinite" restart="never" nodeType="tmRoot"/>
+      </p:par>
+    </p:tnLst>
+  </p:timing>
 </p:sld>
 </file>
 
@@ -8670,11 +9362,18 @@
   <p:clrMapOvr>
     <a:masterClrMapping/>
   </p:clrMapOvr>
+  <p:timing>
+    <p:tnLst>
+      <p:par>
+        <p:cTn xmlns:p14="http://schemas.microsoft.com/office/powerpoint/2010/main" id="1" dur="indefinite" restart="never" nodeType="tmRoot"/>
+      </p:par>
+    </p:tnLst>
+  </p:timing>
 </p:sld>
 </file>
 
 <file path=ppt/slides/slide34.xml><?xml version="1.0" encoding="utf-8"?>
-<p:sld xmlns:a="http://schemas.openxmlformats.org/drawingml/2006/main" xmlns:r="http://schemas.openxmlformats.org/officeDocument/2006/relationships" xmlns:p="http://schemas.openxmlformats.org/presentationml/2006/main">
+<p:sld xmlns:a="http://schemas.openxmlformats.org/drawingml/2006/main" xmlns:r="http://schemas.openxmlformats.org/officeDocument/2006/relationships" xmlns:p="http://schemas.openxmlformats.org/presentationml/2006/main" show="0">
   <p:cSld>
     <p:spTree>
       <p:nvGrpSpPr>
@@ -9195,9 +9894,14 @@
               <a:buChar char="•"/>
             </a:pPr>
             <a:r>
-              <a:rPr lang="en"/>
-              <a:t>La capacitación del personal y su curva de aprendizaje</a:t>
-            </a:r>
+              <a:rPr lang="en" dirty="0"/>
+              <a:t>La capacitación del personal y su curva de </a:t>
+            </a:r>
+            <a:r>
+              <a:rPr lang="en" dirty="0" smtClean="0"/>
+              <a:t>aprendizaje</a:t>
+            </a:r>
+            <a:endParaRPr lang="en" dirty="0"/>
           </a:p>
           <a:p>
             <a:pPr marL="457200" lvl="0" indent="-419100" rtl="0">
@@ -9209,9 +9913,14 @@
               <a:buChar char="•"/>
             </a:pPr>
             <a:r>
-              <a:rPr lang="en"/>
-              <a:t>Nuevos requerimientos en el proyecto</a:t>
-            </a:r>
+              <a:rPr lang="en" dirty="0"/>
+              <a:t>Nuevos requerimientos en el </a:t>
+            </a:r>
+            <a:r>
+              <a:rPr lang="en" dirty="0" smtClean="0"/>
+              <a:t>proyecto</a:t>
+            </a:r>
+            <a:endParaRPr lang="en" dirty="0"/>
           </a:p>
           <a:p>
             <a:pPr marL="457200" lvl="0" indent="-419100" rtl="0">
@@ -9223,9 +9932,14 @@
               <a:buChar char="•"/>
             </a:pPr>
             <a:r>
-              <a:rPr lang="en"/>
-              <a:t>Competencia, mercado, precios</a:t>
-            </a:r>
+              <a:rPr lang="en" dirty="0"/>
+              <a:t>Competencia, mercado, </a:t>
+            </a:r>
+            <a:r>
+              <a:rPr lang="en" dirty="0" smtClean="0"/>
+              <a:t>precios</a:t>
+            </a:r>
+            <a:endParaRPr lang="en" dirty="0"/>
           </a:p>
           <a:p>
             <a:pPr marL="457200" lvl="0" indent="-419100" rtl="0">
@@ -9237,7 +9951,7 @@
               <a:buChar char="•"/>
             </a:pPr>
             <a:r>
-              <a:rPr lang="en"/>
+              <a:rPr lang="en" dirty="0"/>
               <a:t>La situación financiera de la empresa</a:t>
             </a:r>
           </a:p>
@@ -9251,18 +9965,26 @@
               <a:buChar char="•"/>
             </a:pPr>
             <a:r>
-              <a:rPr lang="en"/>
-              <a:t>La reasignación de desarrolladores</a:t>
-            </a:r>
-          </a:p>
-          <a:p>
-            <a:endParaRPr lang="en"/>
-          </a:p>
-          <a:p>
-            <a:endParaRPr lang="en"/>
-          </a:p>
-          <a:p>
-            <a:endParaRPr lang="en"/>
+              <a:rPr lang="es-ES_tradnl" dirty="0" smtClean="0"/>
+              <a:t>El recambio </a:t>
+            </a:r>
+            <a:r>
+              <a:rPr lang="en" dirty="0" smtClean="0"/>
+              <a:t>de </a:t>
+            </a:r>
+            <a:r>
+              <a:rPr lang="en" dirty="0"/>
+              <a:t>desarrolladores</a:t>
+            </a:r>
+          </a:p>
+          <a:p>
+            <a:endParaRPr lang="en" dirty="0"/>
+          </a:p>
+          <a:p>
+            <a:endParaRPr lang="en" dirty="0"/>
+          </a:p>
+          <a:p>
+            <a:endParaRPr lang="en" dirty="0"/>
           </a:p>
         </p:txBody>
       </p:sp>
@@ -9769,18 +10491,29 @@
           <a:p>
             <a:pPr marL="457200" indent="-419100"/>
             <a:r>
+              <a:rPr lang="es-ES_tradnl" dirty="0" smtClean="0"/>
+              <a:t>Ganancia </a:t>
+            </a:r>
+            <a:r>
+              <a:rPr lang="en" dirty="0" smtClean="0"/>
+              <a:t>generad</a:t>
+            </a:r>
+            <a:r>
+              <a:rPr lang="es-ES_tradnl" dirty="0" smtClean="0"/>
+              <a:t>a</a:t>
+            </a:r>
+            <a:r>
+              <a:rPr lang="en" dirty="0" smtClean="0"/>
+              <a:t> </a:t>
+            </a:r>
+            <a:r>
               <a:rPr lang="en" dirty="0"/>
-              <a:t>Ingreso generado por los proyectos aceptados.</a:t>
-            </a:r>
-          </a:p>
-          <a:p>
-            <a:pPr marL="38100" lvl="0" indent="0" rtl="0">
-              <a:buClr>
-                <a:srgbClr val="000000"/>
-              </a:buClr>
-              <a:buSzPct val="166666"/>
-              <a:buNone/>
-            </a:pPr>
+              <a:t>por los proyectos aceptados</a:t>
+            </a:r>
+            <a:r>
+              <a:rPr lang="en" dirty="0" smtClean="0"/>
+              <a:t>.</a:t>
+            </a:r>
             <a:endParaRPr lang="es-ES_tradnl" dirty="0" smtClean="0"/>
           </a:p>
           <a:p>
@@ -9795,23 +10528,24 @@
             <a:r>
               <a:rPr lang="en" dirty="0"/>
               <a:t>
-Costo de oportunidad, ingreso que hubieran generado los proyectos rechazados</a:t>
+Costo de oportunidad, </a:t>
+            </a:r>
+            <a:r>
+              <a:rPr lang="es-ES_tradnl" dirty="0" smtClean="0"/>
+              <a:t>ganancia </a:t>
+            </a:r>
+            <a:r>
+              <a:rPr lang="en" dirty="0" smtClean="0"/>
+              <a:t>que </a:t>
+            </a:r>
+            <a:r>
+              <a:rPr lang="en" dirty="0"/>
+              <a:t>hubieran generado los proyectos rechazados</a:t>
             </a:r>
             <a:r>
               <a:rPr lang="en" dirty="0" smtClean="0"/>
               <a:t>.</a:t>
             </a:r>
-            <a:endParaRPr lang="es-ES_tradnl" dirty="0" smtClean="0"/>
-          </a:p>
-          <a:p>
-            <a:pPr marL="457200" lvl="0" indent="-419100" rtl="0">
-              <a:buClr>
-                <a:srgbClr val="000000"/>
-              </a:buClr>
-              <a:buSzPct val="166666"/>
-              <a:buFont typeface="Arial"/>
-              <a:buChar char="•"/>
-            </a:pPr>
             <a:endParaRPr lang="en" dirty="0"/>
           </a:p>
           <a:p>
@@ -9904,7 +10638,7 @@
           <p:nvPr/>
         </p:nvPicPr>
         <p:blipFill>
-          <a:blip r:embed="rId2"/>
+          <a:blip r:embed="rId3"/>
           <a:stretch>
             <a:fillRect/>
           </a:stretch>
@@ -9924,6 +10658,13 @@
   <p:clrMapOvr>
     <a:masterClrMapping/>
   </p:clrMapOvr>
+  <p:timing>
+    <p:tnLst>
+      <p:par>
+        <p:cTn xmlns:p14="http://schemas.microsoft.com/office/powerpoint/2010/main" id="1" dur="indefinite" restart="never" nodeType="tmRoot"/>
+      </p:par>
+    </p:tnLst>
+  </p:timing>
 </p:sld>
 </file>
 

</xml_diff>